<commit_message>
Added SQL generation of FK constraints. ST FK's now have constraints. More slides to the PPT presentation.
</commit_message>
<xml_diff>
--- a/Articles/semantic database slide show.pptx
+++ b/Articles/semantic database slide show.pptx
@@ -5,7 +5,7 @@
     <p:sldMasterId id="2147483648" r:id="rId1"/>
   </p:sldMasterIdLst>
   <p:notesMasterIdLst>
-    <p:notesMasterId r:id="rId20"/>
+    <p:notesMasterId r:id="rId23"/>
   </p:notesMasterIdLst>
   <p:sldIdLst>
     <p:sldId id="256" r:id="rId2"/>
@@ -26,6 +26,9 @@
     <p:sldId id="271" r:id="rId17"/>
     <p:sldId id="272" r:id="rId18"/>
     <p:sldId id="273" r:id="rId19"/>
+    <p:sldId id="274" r:id="rId20"/>
+    <p:sldId id="275" r:id="rId21"/>
+    <p:sldId id="276" r:id="rId22"/>
   </p:sldIdLst>
   <p:sldSz cx="9144000" cy="6858000" type="screen4x3"/>
   <p:notesSz cx="6858000" cy="9144000"/>
@@ -209,7 +212,7 @@
           <a:p>
             <a:fld id="{1BBCEE66-0EE9-4D66-AF75-6E9EC16E6DD4}" type="datetimeFigureOut">
               <a:rPr lang="en-US" smtClean="0"/>
-              <a:t>10/16/2014</a:t>
+              <a:t>10/18/2014</a:t>
             </a:fld>
             <a:endParaRPr lang="en-US"/>
           </a:p>
@@ -377,6 +380,11 @@
         </p:txBody>
       </p:sp>
     </p:spTree>
+    <p:extLst>
+      <p:ext uri="{BB962C8B-B14F-4D97-AF65-F5344CB8AC3E}">
+        <p14:creationId xmlns:p14="http://schemas.microsoft.com/office/powerpoint/2010/main" val="4242917381"/>
+      </p:ext>
+    </p:extLst>
   </p:cSld>
   <p:clrMap bg1="lt1" tx1="dk1" bg2="lt2" tx2="dk2" accent1="accent1" accent2="accent2" accent3="accent3" accent4="accent4" accent5="accent5" accent6="accent6" hlink="hlink" folHlink="folHlink"/>
   <p:notesStyle>
@@ -655,7 +663,7 @@
           <a:p>
             <a:fld id="{416F8EEF-37D8-470A-AB7E-2B3D8D36A7EE}" type="datetime1">
               <a:rPr lang="en-US" smtClean="0"/>
-              <a:t>10/16/2014</a:t>
+              <a:t>10/18/2014</a:t>
             </a:fld>
             <a:endParaRPr lang="en-US"/>
           </a:p>
@@ -824,7 +832,7 @@
           <a:p>
             <a:fld id="{574DA3A6-D6F5-4169-BAE7-564F753905E4}" type="datetime1">
               <a:rPr lang="en-US" smtClean="0"/>
-              <a:t>10/16/2014</a:t>
+              <a:t>10/18/2014</a:t>
             </a:fld>
             <a:endParaRPr lang="en-US"/>
           </a:p>
@@ -1003,7 +1011,7 @@
           <a:p>
             <a:fld id="{A2848701-8AC6-4C73-9B69-A7E40F70EFF8}" type="datetime1">
               <a:rPr lang="en-US" smtClean="0"/>
-              <a:t>10/16/2014</a:t>
+              <a:t>10/18/2014</a:t>
             </a:fld>
             <a:endParaRPr lang="en-US"/>
           </a:p>
@@ -1172,7 +1180,7 @@
           <a:p>
             <a:fld id="{DA635438-721C-4CE7-AC51-D734B92A82C4}" type="datetime1">
               <a:rPr lang="en-US" smtClean="0"/>
-              <a:t>10/16/2014</a:t>
+              <a:t>10/18/2014</a:t>
             </a:fld>
             <a:endParaRPr lang="en-US"/>
           </a:p>
@@ -1417,7 +1425,7 @@
           <a:p>
             <a:fld id="{92D44B8D-F0F2-4664-87AA-91B33D3773D3}" type="datetime1">
               <a:rPr lang="en-US" smtClean="0"/>
-              <a:t>10/16/2014</a:t>
+              <a:t>10/18/2014</a:t>
             </a:fld>
             <a:endParaRPr lang="en-US"/>
           </a:p>
@@ -1704,7 +1712,7 @@
           <a:p>
             <a:fld id="{DFFCA1ED-0C31-4556-95EC-AF16BC50EBBC}" type="datetime1">
               <a:rPr lang="en-US" smtClean="0"/>
-              <a:t>10/16/2014</a:t>
+              <a:t>10/18/2014</a:t>
             </a:fld>
             <a:endParaRPr lang="en-US"/>
           </a:p>
@@ -2125,7 +2133,7 @@
           <a:p>
             <a:fld id="{98F8F976-7837-4A70-814E-9AC64E1F5B10}" type="datetime1">
               <a:rPr lang="en-US" smtClean="0"/>
-              <a:t>10/16/2014</a:t>
+              <a:t>10/18/2014</a:t>
             </a:fld>
             <a:endParaRPr lang="en-US"/>
           </a:p>
@@ -2242,7 +2250,7 @@
           <a:p>
             <a:fld id="{C953CE0E-2CDE-477B-9918-92DBFD9FFB13}" type="datetime1">
               <a:rPr lang="en-US" smtClean="0"/>
-              <a:t>10/16/2014</a:t>
+              <a:t>10/18/2014</a:t>
             </a:fld>
             <a:endParaRPr lang="en-US"/>
           </a:p>
@@ -2336,7 +2344,7 @@
           <a:p>
             <a:fld id="{B85A8BCB-E84D-41C9-B49A-575D31685D0E}" type="datetime1">
               <a:rPr lang="en-US" smtClean="0"/>
-              <a:t>10/16/2014</a:t>
+              <a:t>10/18/2014</a:t>
             </a:fld>
             <a:endParaRPr lang="en-US"/>
           </a:p>
@@ -2612,7 +2620,7 @@
           <a:p>
             <a:fld id="{E6546150-F9C5-4174-93F1-E118D03D411E}" type="datetime1">
               <a:rPr lang="en-US" smtClean="0"/>
-              <a:t>10/16/2014</a:t>
+              <a:t>10/18/2014</a:t>
             </a:fld>
             <a:endParaRPr lang="en-US"/>
           </a:p>
@@ -2864,7 +2872,7 @@
           <a:p>
             <a:fld id="{267CFDA4-22F4-40DB-A543-AB48B3BE05CD}" type="datetime1">
               <a:rPr lang="en-US" smtClean="0"/>
-              <a:t>10/16/2014</a:t>
+              <a:t>10/18/2014</a:t>
             </a:fld>
             <a:endParaRPr lang="en-US"/>
           </a:p>
@@ -3076,7 +3084,7 @@
           <a:p>
             <a:fld id="{1A9CB782-FDB5-4A81-BFCE-B54E8C709764}" type="datetime1">
               <a:rPr lang="en-US" smtClean="0"/>
-              <a:t>10/16/2014</a:t>
+              <a:t>10/18/2014</a:t>
             </a:fld>
             <a:endParaRPr lang="en-US"/>
           </a:p>
@@ -3929,7 +3937,6 @@
               <a:rPr lang="en-US" i="1" dirty="0" smtClean="0"/>
               <a:t>with what else is in its vicinity.”</a:t>
             </a:r>
-            <a:endParaRPr lang="en-US" i="1" dirty="0" smtClean="0"/>
           </a:p>
         </p:txBody>
       </p:sp>
@@ -4890,7 +4897,7 @@
           <a:p>
             <a:r>
               <a:rPr lang="en-US" dirty="0" smtClean="0"/>
-              <a:t>Example: Semantic Database</a:t>
+              <a:t>Unfolded Semantic Structure</a:t>
             </a:r>
             <a:endParaRPr lang="en-US" dirty="0"/>
           </a:p>
@@ -5012,20 +5019,13 @@
         <p:spPr/>
         <p:txBody>
           <a:bodyPr>
-            <a:normAutofit fontScale="90000"/>
+            <a:normAutofit/>
           </a:bodyPr>
           <a:lstStyle/>
           <a:p>
             <a:r>
               <a:rPr lang="en-US" dirty="0" smtClean="0"/>
-              <a:t>A Semantic Database –</a:t>
-            </a:r>
-            <a:br>
-              <a:rPr lang="en-US" dirty="0" smtClean="0"/>
-            </a:br>
-            <a:r>
-              <a:rPr lang="en-US" dirty="0" smtClean="0"/>
-              <a:t>Is Hierarchical</a:t>
+              <a:t>Hierarchical View</a:t>
             </a:r>
             <a:endParaRPr lang="en-US" dirty="0"/>
           </a:p>
@@ -5088,6 +5088,160 @@
 </p:sld>
 </file>
 
+<file path=ppt/slides/slide19.xml><?xml version="1.0" encoding="utf-8"?>
+<p:sld xmlns:a="http://schemas.openxmlformats.org/drawingml/2006/main" xmlns:r="http://schemas.openxmlformats.org/officeDocument/2006/relationships" xmlns:p="http://schemas.openxmlformats.org/presentationml/2006/main">
+  <p:cSld>
+    <p:spTree>
+      <p:nvGrpSpPr>
+        <p:cNvPr id="1" name=""/>
+        <p:cNvGrpSpPr/>
+        <p:nvPr/>
+      </p:nvGrpSpPr>
+      <p:grpSpPr>
+        <a:xfrm>
+          <a:off x="0" y="0"/>
+          <a:ext cx="0" cy="0"/>
+          <a:chOff x="0" y="0"/>
+          <a:chExt cx="0" cy="0"/>
+        </a:xfrm>
+      </p:grpSpPr>
+      <p:sp>
+        <p:nvSpPr>
+          <p:cNvPr id="2" name="Title 1"/>
+          <p:cNvSpPr>
+            <a:spLocks noGrp="1"/>
+          </p:cNvSpPr>
+          <p:nvPr>
+            <p:ph type="title"/>
+          </p:nvPr>
+        </p:nvSpPr>
+        <p:spPr>
+          <a:xfrm>
+            <a:off x="457200" y="228600"/>
+            <a:ext cx="8229600" cy="1143000"/>
+          </a:xfrm>
+        </p:spPr>
+        <p:txBody>
+          <a:bodyPr>
+            <a:normAutofit fontScale="90000"/>
+          </a:bodyPr>
+          <a:lstStyle/>
+          <a:p>
+            <a:r>
+              <a:rPr lang="en-US" dirty="0" smtClean="0"/>
+              <a:t>Semantic Database</a:t>
+            </a:r>
+            <a:br>
+              <a:rPr lang="en-US" dirty="0" smtClean="0"/>
+            </a:br>
+            <a:r>
+              <a:rPr lang="en-US" sz="3600" dirty="0" smtClean="0"/>
+              <a:t>Schema in an RDBMS</a:t>
+            </a:r>
+            <a:endParaRPr lang="en-US" sz="3600" dirty="0"/>
+          </a:p>
+        </p:txBody>
+      </p:sp>
+      <p:sp>
+        <p:nvSpPr>
+          <p:cNvPr id="4" name="Footer Placeholder 3"/>
+          <p:cNvSpPr>
+            <a:spLocks noGrp="1"/>
+          </p:cNvSpPr>
+          <p:nvPr>
+            <p:ph type="ftr" sz="quarter" idx="11"/>
+          </p:nvPr>
+        </p:nvSpPr>
+        <p:spPr/>
+        <p:txBody>
+          <a:bodyPr/>
+          <a:lstStyle/>
+          <a:p>
+            <a:r>
+              <a:rPr lang="en-US" smtClean="0"/>
+              <a:t>(c) 2014 Marc Clifton</a:t>
+            </a:r>
+            <a:endParaRPr lang="en-US"/>
+          </a:p>
+        </p:txBody>
+      </p:sp>
+      <p:pic>
+        <p:nvPicPr>
+          <p:cNvPr id="1026" name="Picture 2"/>
+          <p:cNvPicPr>
+            <a:picLocks noChangeAspect="1" noChangeArrowheads="1"/>
+          </p:cNvPicPr>
+          <p:nvPr/>
+        </p:nvPicPr>
+        <p:blipFill>
+          <a:blip r:embed="rId2">
+            <a:extLst>
+              <a:ext uri="{28A0092B-C50C-407E-A947-70E740481C1C}">
+                <a14:useLocalDpi xmlns:a14="http://schemas.microsoft.com/office/drawing/2010/main" val="0"/>
+              </a:ext>
+            </a:extLst>
+          </a:blip>
+          <a:srcRect/>
+          <a:stretch>
+            <a:fillRect/>
+          </a:stretch>
+        </p:blipFill>
+        <p:spPr bwMode="auto">
+          <a:xfrm>
+            <a:off x="1028700" y="1371600"/>
+            <a:ext cx="7086600" cy="5010150"/>
+          </a:xfrm>
+          <a:prstGeom prst="rect">
+            <a:avLst/>
+          </a:prstGeom>
+          <a:noFill/>
+          <a:ln>
+            <a:noFill/>
+          </a:ln>
+          <a:effectLst/>
+          <a:extLst>
+            <a:ext uri="{909E8E84-426E-40DD-AFC4-6F175D3DCCD1}">
+              <a14:hiddenFill xmlns:a14="http://schemas.microsoft.com/office/drawing/2010/main">
+                <a:solidFill>
+                  <a:schemeClr val="accent1"/>
+                </a:solidFill>
+              </a14:hiddenFill>
+            </a:ext>
+            <a:ext uri="{91240B29-F687-4F45-9708-019B960494DF}">
+              <a14:hiddenLine xmlns:a14="http://schemas.microsoft.com/office/drawing/2010/main" w="9525">
+                <a:solidFill>
+                  <a:schemeClr val="tx1"/>
+                </a:solidFill>
+                <a:miter lim="800000"/>
+                <a:headEnd/>
+                <a:tailEnd/>
+              </a14:hiddenLine>
+            </a:ext>
+            <a:ext uri="{AF507438-7753-43E0-B8FC-AC1667EBCBE1}">
+              <a14:hiddenEffects xmlns:a14="http://schemas.microsoft.com/office/drawing/2010/main">
+                <a:effectLst>
+                  <a:outerShdw dist="35921" dir="2700000" algn="ctr" rotWithShape="0">
+                    <a:schemeClr val="bg2"/>
+                  </a:outerShdw>
+                </a:effectLst>
+              </a14:hiddenEffects>
+            </a:ext>
+          </a:extLst>
+        </p:spPr>
+      </p:pic>
+    </p:spTree>
+    <p:extLst>
+      <p:ext uri="{BB962C8B-B14F-4D97-AF65-F5344CB8AC3E}">
+        <p14:creationId xmlns:p14="http://schemas.microsoft.com/office/powerpoint/2010/main" val="740560620"/>
+      </p:ext>
+    </p:extLst>
+  </p:cSld>
+  <p:clrMapOvr>
+    <a:masterClrMapping/>
+  </p:clrMapOvr>
+</p:sld>
+</file>
+
 <file path=ppt/slides/slide2.xml><?xml version="1.0" encoding="utf-8"?>
 <p:sld xmlns:a="http://schemas.openxmlformats.org/drawingml/2006/main" xmlns:r="http://schemas.openxmlformats.org/officeDocument/2006/relationships" xmlns:p="http://schemas.openxmlformats.org/presentationml/2006/main">
   <p:cSld>
@@ -5200,6 +5354,373 @@
         </p:txBody>
       </p:sp>
     </p:spTree>
+  </p:cSld>
+  <p:clrMapOvr>
+    <a:masterClrMapping/>
+  </p:clrMapOvr>
+</p:sld>
+</file>
+
+<file path=ppt/slides/slide20.xml><?xml version="1.0" encoding="utf-8"?>
+<p:sld xmlns:a="http://schemas.openxmlformats.org/drawingml/2006/main" xmlns:r="http://schemas.openxmlformats.org/officeDocument/2006/relationships" xmlns:p="http://schemas.openxmlformats.org/presentationml/2006/main">
+  <p:cSld>
+    <p:spTree>
+      <p:nvGrpSpPr>
+        <p:cNvPr id="1" name=""/>
+        <p:cNvGrpSpPr/>
+        <p:nvPr/>
+      </p:nvGrpSpPr>
+      <p:grpSpPr>
+        <a:xfrm>
+          <a:off x="0" y="0"/>
+          <a:ext cx="0" cy="0"/>
+          <a:chOff x="0" y="0"/>
+          <a:chExt cx="0" cy="0"/>
+        </a:xfrm>
+      </p:grpSpPr>
+      <p:sp>
+        <p:nvSpPr>
+          <p:cNvPr id="2" name="Title 1"/>
+          <p:cNvSpPr>
+            <a:spLocks noGrp="1"/>
+          </p:cNvSpPr>
+          <p:nvPr>
+            <p:ph type="title"/>
+          </p:nvPr>
+        </p:nvSpPr>
+        <p:spPr/>
+        <p:txBody>
+          <a:bodyPr/>
+          <a:lstStyle/>
+          <a:p>
+            <a:r>
+              <a:rPr lang="en-US" dirty="0" smtClean="0"/>
+              <a:t>Things to Notice</a:t>
+            </a:r>
+            <a:endParaRPr lang="en-US" dirty="0"/>
+          </a:p>
+        </p:txBody>
+      </p:sp>
+      <p:sp>
+        <p:nvSpPr>
+          <p:cNvPr id="3" name="Content Placeholder 2"/>
+          <p:cNvSpPr>
+            <a:spLocks noGrp="1"/>
+          </p:cNvSpPr>
+          <p:nvPr>
+            <p:ph idx="1"/>
+          </p:nvPr>
+        </p:nvSpPr>
+        <p:spPr>
+          <a:xfrm>
+            <a:off x="457200" y="1600200"/>
+            <a:ext cx="5791200" cy="4525963"/>
+          </a:xfrm>
+        </p:spPr>
+        <p:txBody>
+          <a:bodyPr>
+            <a:normAutofit/>
+          </a:bodyPr>
+          <a:lstStyle/>
+          <a:p>
+            <a:r>
+              <a:rPr lang="en-US" dirty="0" smtClean="0"/>
+              <a:t>The “deepest” semantic types are almost always composed just of foreign keys.</a:t>
+            </a:r>
+          </a:p>
+          <a:p>
+            <a:endParaRPr lang="en-US" dirty="0" smtClean="0"/>
+          </a:p>
+          <a:p>
+            <a:r>
+              <a:rPr lang="en-US" dirty="0" smtClean="0"/>
+              <a:t>Tables with native types are very “thin”, having very few fields.</a:t>
+            </a:r>
+          </a:p>
+        </p:txBody>
+      </p:sp>
+      <p:sp>
+        <p:nvSpPr>
+          <p:cNvPr id="4" name="Footer Placeholder 3"/>
+          <p:cNvSpPr>
+            <a:spLocks noGrp="1"/>
+          </p:cNvSpPr>
+          <p:nvPr>
+            <p:ph type="ftr" sz="quarter" idx="11"/>
+          </p:nvPr>
+        </p:nvSpPr>
+        <p:spPr/>
+        <p:txBody>
+          <a:bodyPr/>
+          <a:lstStyle/>
+          <a:p>
+            <a:r>
+              <a:rPr lang="en-US" smtClean="0"/>
+              <a:t>(c) 2014 Marc Clifton</a:t>
+            </a:r>
+            <a:endParaRPr lang="en-US"/>
+          </a:p>
+        </p:txBody>
+      </p:sp>
+      <p:pic>
+        <p:nvPicPr>
+          <p:cNvPr id="2050" name="Picture 2"/>
+          <p:cNvPicPr>
+            <a:picLocks noChangeAspect="1" noChangeArrowheads="1"/>
+          </p:cNvPicPr>
+          <p:nvPr/>
+        </p:nvPicPr>
+        <p:blipFill>
+          <a:blip r:embed="rId2">
+            <a:extLst>
+              <a:ext uri="{28A0092B-C50C-407E-A947-70E740481C1C}">
+                <a14:useLocalDpi xmlns:a14="http://schemas.microsoft.com/office/drawing/2010/main" val="0"/>
+              </a:ext>
+            </a:extLst>
+          </a:blip>
+          <a:srcRect/>
+          <a:stretch>
+            <a:fillRect/>
+          </a:stretch>
+        </p:blipFill>
+        <p:spPr bwMode="auto">
+          <a:xfrm>
+            <a:off x="6019800" y="1676400"/>
+            <a:ext cx="2203225" cy="1602345"/>
+          </a:xfrm>
+          <a:prstGeom prst="rect">
+            <a:avLst/>
+          </a:prstGeom>
+          <a:noFill/>
+          <a:ln>
+            <a:noFill/>
+          </a:ln>
+          <a:effectLst/>
+          <a:extLst>
+            <a:ext uri="{909E8E84-426E-40DD-AFC4-6F175D3DCCD1}">
+              <a14:hiddenFill xmlns:a14="http://schemas.microsoft.com/office/drawing/2010/main">
+                <a:solidFill>
+                  <a:schemeClr val="accent1"/>
+                </a:solidFill>
+              </a14:hiddenFill>
+            </a:ext>
+            <a:ext uri="{91240B29-F687-4F45-9708-019B960494DF}">
+              <a14:hiddenLine xmlns:a14="http://schemas.microsoft.com/office/drawing/2010/main" w="9525">
+                <a:solidFill>
+                  <a:schemeClr val="tx1"/>
+                </a:solidFill>
+                <a:miter lim="800000"/>
+                <a:headEnd/>
+                <a:tailEnd/>
+              </a14:hiddenLine>
+            </a:ext>
+            <a:ext uri="{AF507438-7753-43E0-B8FC-AC1667EBCBE1}">
+              <a14:hiddenEffects xmlns:a14="http://schemas.microsoft.com/office/drawing/2010/main">
+                <a:effectLst>
+                  <a:outerShdw dist="35921" dir="2700000" algn="ctr" rotWithShape="0">
+                    <a:schemeClr val="bg2"/>
+                  </a:outerShdw>
+                </a:effectLst>
+              </a14:hiddenEffects>
+            </a:ext>
+          </a:extLst>
+        </p:spPr>
+      </p:pic>
+      <p:pic>
+        <p:nvPicPr>
+          <p:cNvPr id="2051" name="Picture 3"/>
+          <p:cNvPicPr>
+            <a:picLocks noChangeAspect="1" noChangeArrowheads="1"/>
+          </p:cNvPicPr>
+          <p:nvPr/>
+        </p:nvPicPr>
+        <p:blipFill>
+          <a:blip r:embed="rId3">
+            <a:extLst>
+              <a:ext uri="{28A0092B-C50C-407E-A947-70E740481C1C}">
+                <a14:useLocalDpi xmlns:a14="http://schemas.microsoft.com/office/drawing/2010/main" val="0"/>
+              </a:ext>
+            </a:extLst>
+          </a:blip>
+          <a:srcRect/>
+          <a:stretch>
+            <a:fillRect/>
+          </a:stretch>
+        </p:blipFill>
+        <p:spPr bwMode="auto">
+          <a:xfrm>
+            <a:off x="5654562" y="4191000"/>
+            <a:ext cx="2933700" cy="800100"/>
+          </a:xfrm>
+          <a:prstGeom prst="rect">
+            <a:avLst/>
+          </a:prstGeom>
+          <a:noFill/>
+          <a:ln>
+            <a:noFill/>
+          </a:ln>
+          <a:effectLst/>
+          <a:extLst>
+            <a:ext uri="{909E8E84-426E-40DD-AFC4-6F175D3DCCD1}">
+              <a14:hiddenFill xmlns:a14="http://schemas.microsoft.com/office/drawing/2010/main">
+                <a:solidFill>
+                  <a:schemeClr val="accent1"/>
+                </a:solidFill>
+              </a14:hiddenFill>
+            </a:ext>
+            <a:ext uri="{91240B29-F687-4F45-9708-019B960494DF}">
+              <a14:hiddenLine xmlns:a14="http://schemas.microsoft.com/office/drawing/2010/main" w="9525">
+                <a:solidFill>
+                  <a:schemeClr val="tx1"/>
+                </a:solidFill>
+                <a:miter lim="800000"/>
+                <a:headEnd/>
+                <a:tailEnd/>
+              </a14:hiddenLine>
+            </a:ext>
+            <a:ext uri="{AF507438-7753-43E0-B8FC-AC1667EBCBE1}">
+              <a14:hiddenEffects xmlns:a14="http://schemas.microsoft.com/office/drawing/2010/main">
+                <a:effectLst>
+                  <a:outerShdw dist="35921" dir="2700000" algn="ctr" rotWithShape="0">
+                    <a:schemeClr val="bg2"/>
+                  </a:outerShdw>
+                </a:effectLst>
+              </a14:hiddenEffects>
+            </a:ext>
+          </a:extLst>
+        </p:spPr>
+      </p:pic>
+    </p:spTree>
+    <p:extLst>
+      <p:ext uri="{BB962C8B-B14F-4D97-AF65-F5344CB8AC3E}">
+        <p14:creationId xmlns:p14="http://schemas.microsoft.com/office/powerpoint/2010/main" val="1163032118"/>
+      </p:ext>
+    </p:extLst>
+  </p:cSld>
+  <p:clrMapOvr>
+    <a:masterClrMapping/>
+  </p:clrMapOvr>
+</p:sld>
+</file>
+
+<file path=ppt/slides/slide21.xml><?xml version="1.0" encoding="utf-8"?>
+<p:sld xmlns:a="http://schemas.openxmlformats.org/drawingml/2006/main" xmlns:r="http://schemas.openxmlformats.org/officeDocument/2006/relationships" xmlns:p="http://schemas.openxmlformats.org/presentationml/2006/main">
+  <p:cSld>
+    <p:spTree>
+      <p:nvGrpSpPr>
+        <p:cNvPr id="1" name=""/>
+        <p:cNvGrpSpPr/>
+        <p:nvPr/>
+      </p:nvGrpSpPr>
+      <p:grpSpPr>
+        <a:xfrm>
+          <a:off x="0" y="0"/>
+          <a:ext cx="0" cy="0"/>
+          <a:chOff x="0" y="0"/>
+          <a:chExt cx="0" cy="0"/>
+        </a:xfrm>
+      </p:grpSpPr>
+      <p:sp>
+        <p:nvSpPr>
+          <p:cNvPr id="2" name="Title 1"/>
+          <p:cNvSpPr>
+            <a:spLocks noGrp="1"/>
+          </p:cNvSpPr>
+          <p:nvPr>
+            <p:ph type="title"/>
+          </p:nvPr>
+        </p:nvSpPr>
+        <p:spPr/>
+        <p:txBody>
+          <a:bodyPr/>
+          <a:lstStyle/>
+          <a:p>
+            <a:r>
+              <a:rPr lang="en-US" dirty="0" smtClean="0"/>
+              <a:t>So What?</a:t>
+            </a:r>
+            <a:endParaRPr lang="en-US" dirty="0"/>
+          </a:p>
+        </p:txBody>
+      </p:sp>
+      <p:sp>
+        <p:nvSpPr>
+          <p:cNvPr id="3" name="Content Placeholder 2"/>
+          <p:cNvSpPr>
+            <a:spLocks noGrp="1"/>
+          </p:cNvSpPr>
+          <p:nvPr>
+            <p:ph idx="1"/>
+          </p:nvPr>
+        </p:nvSpPr>
+        <p:spPr>
+          <a:xfrm>
+            <a:off x="457200" y="1600200"/>
+            <a:ext cx="8077200" cy="4525963"/>
+          </a:xfrm>
+        </p:spPr>
+        <p:txBody>
+          <a:bodyPr/>
+          <a:lstStyle/>
+          <a:p>
+            <a:r>
+              <a:rPr lang="en-US" dirty="0" smtClean="0"/>
+              <a:t>We can now ask:</a:t>
+            </a:r>
+          </a:p>
+          <a:p>
+            <a:pPr lvl="1"/>
+            <a:r>
+              <a:rPr lang="en-US" dirty="0" smtClean="0"/>
+              <a:t>What are all the URL’s recorded in the system?</a:t>
+            </a:r>
+          </a:p>
+          <a:p>
+            <a:pPr lvl="1"/>
+            <a:r>
+              <a:rPr lang="en-US" dirty="0" smtClean="0"/>
+              <a:t>What are the URL’s we have visited</a:t>
+            </a:r>
+          </a:p>
+          <a:p>
+            <a:pPr lvl="1"/>
+            <a:r>
+              <a:rPr lang="en-US" dirty="0" smtClean="0"/>
+              <a:t>                                             </a:t>
+            </a:r>
+            <a:endParaRPr lang="en-US" dirty="0"/>
+          </a:p>
+        </p:txBody>
+      </p:sp>
+      <p:sp>
+        <p:nvSpPr>
+          <p:cNvPr id="4" name="Footer Placeholder 3"/>
+          <p:cNvSpPr>
+            <a:spLocks noGrp="1"/>
+          </p:cNvSpPr>
+          <p:nvPr>
+            <p:ph type="ftr" sz="quarter" idx="11"/>
+          </p:nvPr>
+        </p:nvSpPr>
+        <p:spPr/>
+        <p:txBody>
+          <a:bodyPr/>
+          <a:lstStyle/>
+          <a:p>
+            <a:r>
+              <a:rPr lang="en-US" smtClean="0"/>
+              <a:t>(c) 2014 Marc Clifton</a:t>
+            </a:r>
+            <a:endParaRPr lang="en-US"/>
+          </a:p>
+        </p:txBody>
+      </p:sp>
+    </p:spTree>
+    <p:extLst>
+      <p:ext uri="{BB962C8B-B14F-4D97-AF65-F5344CB8AC3E}">
+        <p14:creationId xmlns:p14="http://schemas.microsoft.com/office/powerpoint/2010/main" val="3629026808"/>
+      </p:ext>
+    </p:extLst>
   </p:cSld>
   <p:clrMapOvr>
     <a:masterClrMapping/>

</xml_diff>

<commit_message>
WIP on adding RSS feed bookmark functionality. WIP on the PPT presentation.
</commit_message>
<xml_diff>
--- a/Articles/semantic database slide show.pptx
+++ b/Articles/semantic database slide show.pptx
@@ -5,7 +5,7 @@
     <p:sldMasterId id="2147483648" r:id="rId1"/>
   </p:sldMasterIdLst>
   <p:notesMasterIdLst>
-    <p:notesMasterId r:id="rId23"/>
+    <p:notesMasterId r:id="rId28"/>
   </p:notesMasterIdLst>
   <p:sldIdLst>
     <p:sldId id="256" r:id="rId2"/>
@@ -29,6 +29,11 @@
     <p:sldId id="274" r:id="rId20"/>
     <p:sldId id="275" r:id="rId21"/>
     <p:sldId id="276" r:id="rId22"/>
+    <p:sldId id="281" r:id="rId23"/>
+    <p:sldId id="277" r:id="rId24"/>
+    <p:sldId id="278" r:id="rId25"/>
+    <p:sldId id="279" r:id="rId26"/>
+    <p:sldId id="280" r:id="rId27"/>
   </p:sldIdLst>
   <p:sldSz cx="9144000" cy="6858000" type="screen4x3"/>
   <p:notesSz cx="6858000" cy="9144000"/>
@@ -212,7 +217,7 @@
           <a:p>
             <a:fld id="{1BBCEE66-0EE9-4D66-AF75-6E9EC16E6DD4}" type="datetimeFigureOut">
               <a:rPr lang="en-US" smtClean="0"/>
-              <a:t>10/18/2014</a:t>
+              <a:t>10/19/2014</a:t>
             </a:fld>
             <a:endParaRPr lang="en-US"/>
           </a:p>
@@ -663,7 +668,7 @@
           <a:p>
             <a:fld id="{416F8EEF-37D8-470A-AB7E-2B3D8D36A7EE}" type="datetime1">
               <a:rPr lang="en-US" smtClean="0"/>
-              <a:t>10/18/2014</a:t>
+              <a:t>10/19/2014</a:t>
             </a:fld>
             <a:endParaRPr lang="en-US"/>
           </a:p>
@@ -832,7 +837,7 @@
           <a:p>
             <a:fld id="{574DA3A6-D6F5-4169-BAE7-564F753905E4}" type="datetime1">
               <a:rPr lang="en-US" smtClean="0"/>
-              <a:t>10/18/2014</a:t>
+              <a:t>10/19/2014</a:t>
             </a:fld>
             <a:endParaRPr lang="en-US"/>
           </a:p>
@@ -1011,7 +1016,7 @@
           <a:p>
             <a:fld id="{A2848701-8AC6-4C73-9B69-A7E40F70EFF8}" type="datetime1">
               <a:rPr lang="en-US" smtClean="0"/>
-              <a:t>10/18/2014</a:t>
+              <a:t>10/19/2014</a:t>
             </a:fld>
             <a:endParaRPr lang="en-US"/>
           </a:p>
@@ -1180,7 +1185,7 @@
           <a:p>
             <a:fld id="{DA635438-721C-4CE7-AC51-D734B92A82C4}" type="datetime1">
               <a:rPr lang="en-US" smtClean="0"/>
-              <a:t>10/18/2014</a:t>
+              <a:t>10/19/2014</a:t>
             </a:fld>
             <a:endParaRPr lang="en-US"/>
           </a:p>
@@ -1425,7 +1430,7 @@
           <a:p>
             <a:fld id="{92D44B8D-F0F2-4664-87AA-91B33D3773D3}" type="datetime1">
               <a:rPr lang="en-US" smtClean="0"/>
-              <a:t>10/18/2014</a:t>
+              <a:t>10/19/2014</a:t>
             </a:fld>
             <a:endParaRPr lang="en-US"/>
           </a:p>
@@ -1712,7 +1717,7 @@
           <a:p>
             <a:fld id="{DFFCA1ED-0C31-4556-95EC-AF16BC50EBBC}" type="datetime1">
               <a:rPr lang="en-US" smtClean="0"/>
-              <a:t>10/18/2014</a:t>
+              <a:t>10/19/2014</a:t>
             </a:fld>
             <a:endParaRPr lang="en-US"/>
           </a:p>
@@ -2133,7 +2138,7 @@
           <a:p>
             <a:fld id="{98F8F976-7837-4A70-814E-9AC64E1F5B10}" type="datetime1">
               <a:rPr lang="en-US" smtClean="0"/>
-              <a:t>10/18/2014</a:t>
+              <a:t>10/19/2014</a:t>
             </a:fld>
             <a:endParaRPr lang="en-US"/>
           </a:p>
@@ -2250,7 +2255,7 @@
           <a:p>
             <a:fld id="{C953CE0E-2CDE-477B-9918-92DBFD9FFB13}" type="datetime1">
               <a:rPr lang="en-US" smtClean="0"/>
-              <a:t>10/18/2014</a:t>
+              <a:t>10/19/2014</a:t>
             </a:fld>
             <a:endParaRPr lang="en-US"/>
           </a:p>
@@ -2344,7 +2349,7 @@
           <a:p>
             <a:fld id="{B85A8BCB-E84D-41C9-B49A-575D31685D0E}" type="datetime1">
               <a:rPr lang="en-US" smtClean="0"/>
-              <a:t>10/18/2014</a:t>
+              <a:t>10/19/2014</a:t>
             </a:fld>
             <a:endParaRPr lang="en-US"/>
           </a:p>
@@ -2620,7 +2625,7 @@
           <a:p>
             <a:fld id="{E6546150-F9C5-4174-93F1-E118D03D411E}" type="datetime1">
               <a:rPr lang="en-US" smtClean="0"/>
-              <a:t>10/18/2014</a:t>
+              <a:t>10/19/2014</a:t>
             </a:fld>
             <a:endParaRPr lang="en-US"/>
           </a:p>
@@ -2872,7 +2877,7 @@
           <a:p>
             <a:fld id="{267CFDA4-22F4-40DB-A543-AB48B3BE05CD}" type="datetime1">
               <a:rPr lang="en-US" smtClean="0"/>
-              <a:t>10/18/2014</a:t>
+              <a:t>10/19/2014</a:t>
             </a:fld>
             <a:endParaRPr lang="en-US"/>
           </a:p>
@@ -3084,7 +3089,7 @@
           <a:p>
             <a:fld id="{1A9CB782-FDB5-4A81-BFCE-B54E8C709764}" type="datetime1">
               <a:rPr lang="en-US" smtClean="0"/>
-              <a:t>10/18/2014</a:t>
+              <a:t>10/19/2014</a:t>
             </a:fld>
             <a:endParaRPr lang="en-US"/>
           </a:p>
@@ -5660,7 +5665,9 @@
           </a:xfrm>
         </p:spPr>
         <p:txBody>
-          <a:bodyPr/>
+          <a:bodyPr>
+            <a:normAutofit/>
+          </a:bodyPr>
           <a:lstStyle/>
           <a:p>
             <a:r>
@@ -5679,15 +5686,46 @@
             <a:pPr lvl="1"/>
             <a:r>
               <a:rPr lang="en-US" dirty="0" smtClean="0"/>
-              <a:t>What are the URL’s we have visited</a:t>
-            </a:r>
+              <a:t>What are the URL’s we have </a:t>
+            </a:r>
+            <a:r>
+              <a:rPr lang="en-US" dirty="0" smtClean="0"/>
+              <a:t>visited?</a:t>
+            </a:r>
+            <a:endParaRPr lang="en-US" dirty="0" smtClean="0"/>
           </a:p>
           <a:p>
             <a:pPr lvl="1"/>
             <a:r>
               <a:rPr lang="en-US" dirty="0" smtClean="0"/>
-              <a:t>                                             </a:t>
-            </a:r>
+              <a:t>What URL’s are associated with feeds?</a:t>
+            </a:r>
+          </a:p>
+          <a:p>
+            <a:pPr lvl="1"/>
+            <a:r>
+              <a:rPr lang="en-US" dirty="0" smtClean="0"/>
+              <a:t>What are all the values of “Title”?</a:t>
+            </a:r>
+          </a:p>
+          <a:p>
+            <a:pPr lvl="1"/>
+            <a:r>
+              <a:rPr lang="en-US" dirty="0" smtClean="0"/>
+              <a:t>What are all the feed names?</a:t>
+            </a:r>
+          </a:p>
+          <a:p>
+            <a:pPr lvl="1"/>
+            <a:r>
+              <a:rPr lang="en-US" dirty="0" smtClean="0"/>
+              <a:t>Etc.</a:t>
+            </a:r>
+          </a:p>
+          <a:p>
+            <a:pPr marL="457200" lvl="1" indent="0">
+              <a:buNone/>
+            </a:pPr>
             <a:endParaRPr lang="en-US" dirty="0"/>
           </a:p>
         </p:txBody>
@@ -5719,6 +5757,773 @@
     <p:extLst>
       <p:ext uri="{BB962C8B-B14F-4D97-AF65-F5344CB8AC3E}">
         <p14:creationId xmlns:p14="http://schemas.microsoft.com/office/powerpoint/2010/main" val="3629026808"/>
+      </p:ext>
+    </p:extLst>
+  </p:cSld>
+  <p:clrMapOvr>
+    <a:masterClrMapping/>
+  </p:clrMapOvr>
+</p:sld>
+</file>
+
+<file path=ppt/slides/slide22.xml><?xml version="1.0" encoding="utf-8"?>
+<p:sld xmlns:a="http://schemas.openxmlformats.org/drawingml/2006/main" xmlns:r="http://schemas.openxmlformats.org/officeDocument/2006/relationships" xmlns:p="http://schemas.openxmlformats.org/presentationml/2006/main">
+  <p:cSld>
+    <p:spTree>
+      <p:nvGrpSpPr>
+        <p:cNvPr id="1" name=""/>
+        <p:cNvGrpSpPr/>
+        <p:nvPr/>
+      </p:nvGrpSpPr>
+      <p:grpSpPr>
+        <a:xfrm>
+          <a:off x="0" y="0"/>
+          <a:ext cx="0" cy="0"/>
+          <a:chOff x="0" y="0"/>
+          <a:chExt cx="0" cy="0"/>
+        </a:xfrm>
+      </p:grpSpPr>
+      <p:sp>
+        <p:nvSpPr>
+          <p:cNvPr id="2" name="Title 1"/>
+          <p:cNvSpPr>
+            <a:spLocks noGrp="1"/>
+          </p:cNvSpPr>
+          <p:nvPr>
+            <p:ph type="title"/>
+          </p:nvPr>
+        </p:nvSpPr>
+        <p:spPr/>
+        <p:txBody>
+          <a:bodyPr>
+            <a:normAutofit fontScale="90000"/>
+          </a:bodyPr>
+          <a:lstStyle/>
+          <a:p>
+            <a:r>
+              <a:rPr lang="en-US" dirty="0" smtClean="0"/>
+              <a:t>Joining Two or More Semantic Types</a:t>
+            </a:r>
+            <a:endParaRPr lang="en-US" dirty="0"/>
+          </a:p>
+        </p:txBody>
+      </p:sp>
+      <p:sp>
+        <p:nvSpPr>
+          <p:cNvPr id="3" name="Content Placeholder 2"/>
+          <p:cNvSpPr>
+            <a:spLocks noGrp="1"/>
+          </p:cNvSpPr>
+          <p:nvPr>
+            <p:ph idx="1"/>
+          </p:nvPr>
+        </p:nvSpPr>
+        <p:spPr/>
+        <p:txBody>
+          <a:bodyPr/>
+          <a:lstStyle/>
+          <a:p>
+            <a:r>
+              <a:rPr lang="en-US" dirty="0" smtClean="0"/>
+              <a:t>A new ST hierarchy is </a:t>
+            </a:r>
+            <a:r>
+              <a:rPr lang="en-US" smtClean="0"/>
+              <a:t>dynamically created:</a:t>
+            </a:r>
+          </a:p>
+          <a:p>
+            <a:endParaRPr lang="en-US"/>
+          </a:p>
+        </p:txBody>
+      </p:sp>
+      <p:sp>
+        <p:nvSpPr>
+          <p:cNvPr id="4" name="Footer Placeholder 3"/>
+          <p:cNvSpPr>
+            <a:spLocks noGrp="1"/>
+          </p:cNvSpPr>
+          <p:nvPr>
+            <p:ph type="ftr" sz="quarter" idx="11"/>
+          </p:nvPr>
+        </p:nvSpPr>
+        <p:spPr/>
+        <p:txBody>
+          <a:bodyPr/>
+          <a:lstStyle/>
+          <a:p>
+            <a:r>
+              <a:rPr lang="en-US" smtClean="0"/>
+              <a:t>(c) 2014 Marc Clifton</a:t>
+            </a:r>
+            <a:endParaRPr lang="en-US"/>
+          </a:p>
+        </p:txBody>
+      </p:sp>
+    </p:spTree>
+    <p:extLst>
+      <p:ext uri="{BB962C8B-B14F-4D97-AF65-F5344CB8AC3E}">
+        <p14:creationId xmlns:p14="http://schemas.microsoft.com/office/powerpoint/2010/main" val="1204671317"/>
+      </p:ext>
+    </p:extLst>
+  </p:cSld>
+  <p:clrMapOvr>
+    <a:masterClrMapping/>
+  </p:clrMapOvr>
+</p:sld>
+</file>
+
+<file path=ppt/slides/slide23.xml><?xml version="1.0" encoding="utf-8"?>
+<p:sld xmlns:a="http://schemas.openxmlformats.org/drawingml/2006/main" xmlns:r="http://schemas.openxmlformats.org/officeDocument/2006/relationships" xmlns:p="http://schemas.openxmlformats.org/presentationml/2006/main">
+  <p:cSld>
+    <p:spTree>
+      <p:nvGrpSpPr>
+        <p:cNvPr id="1" name=""/>
+        <p:cNvGrpSpPr/>
+        <p:nvPr/>
+      </p:nvGrpSpPr>
+      <p:grpSpPr>
+        <a:xfrm>
+          <a:off x="0" y="0"/>
+          <a:ext cx="0" cy="0"/>
+          <a:chOff x="0" y="0"/>
+          <a:chExt cx="0" cy="0"/>
+        </a:xfrm>
+      </p:grpSpPr>
+      <p:sp>
+        <p:nvSpPr>
+          <p:cNvPr id="2" name="Title 1"/>
+          <p:cNvSpPr>
+            <a:spLocks noGrp="1"/>
+          </p:cNvSpPr>
+          <p:nvPr>
+            <p:ph type="title"/>
+          </p:nvPr>
+        </p:nvSpPr>
+        <p:spPr/>
+        <p:txBody>
+          <a:bodyPr/>
+          <a:lstStyle/>
+          <a:p>
+            <a:r>
+              <a:rPr lang="en-US" dirty="0" smtClean="0"/>
+              <a:t>Benefits of a Semantic Database</a:t>
+            </a:r>
+            <a:endParaRPr lang="en-US" dirty="0"/>
+          </a:p>
+        </p:txBody>
+      </p:sp>
+      <p:sp>
+        <p:nvSpPr>
+          <p:cNvPr id="3" name="Content Placeholder 2"/>
+          <p:cNvSpPr>
+            <a:spLocks noGrp="1"/>
+          </p:cNvSpPr>
+          <p:nvPr>
+            <p:ph idx="1"/>
+          </p:nvPr>
+        </p:nvSpPr>
+        <p:spPr/>
+        <p:txBody>
+          <a:bodyPr>
+            <a:normAutofit fontScale="92500" lnSpcReduction="10000"/>
+          </a:bodyPr>
+          <a:lstStyle/>
+          <a:p>
+            <a:pPr marL="342900" lvl="1" indent="-342900">
+              <a:buFont typeface="Arial" pitchFamily="34" charset="0"/>
+              <a:buChar char="•"/>
+            </a:pPr>
+            <a:r>
+              <a:rPr lang="en-US" dirty="0"/>
+              <a:t>By preserving semantic structure, we can </a:t>
+            </a:r>
+            <a:r>
+              <a:rPr lang="en-US" dirty="0" smtClean="0"/>
+              <a:t>query the database at different levels of semantic meaning, from very specific to very general.</a:t>
+            </a:r>
+          </a:p>
+          <a:p>
+            <a:pPr marL="742950" lvl="2" indent="-342900"/>
+            <a:r>
+              <a:rPr lang="en-US" dirty="0" smtClean="0"/>
+              <a:t>For example, the semantic type “Title” is very general but allows us to ask “what are all the values of things having the meaning “Title”?</a:t>
+            </a:r>
+          </a:p>
+          <a:p>
+            <a:pPr marL="742950" lvl="2" indent="-342900"/>
+            <a:r>
+              <a:rPr lang="en-US" dirty="0" smtClean="0"/>
+              <a:t>By inspecting the relationships, we can ask “what are the things having “Title” in their meaning?</a:t>
+            </a:r>
+          </a:p>
+          <a:p>
+            <a:pPr marL="742950" lvl="2" indent="-342900"/>
+            <a:r>
+              <a:rPr lang="en-US" dirty="0" smtClean="0"/>
+              <a:t>When we query the database, we don’t just get back a list of records – we get back fully “rehydrated” semantic types.</a:t>
+            </a:r>
+          </a:p>
+          <a:p>
+            <a:pPr marL="1200150" lvl="3" indent="-342900"/>
+            <a:r>
+              <a:rPr lang="en-US" dirty="0" smtClean="0"/>
+              <a:t>In other words, the need for a separate ORM is eliminated:</a:t>
+            </a:r>
+          </a:p>
+          <a:p>
+            <a:pPr marL="1657350" lvl="4" indent="-342900"/>
+            <a:r>
+              <a:rPr lang="en-US" dirty="0" smtClean="0"/>
+              <a:t>We pass in semantic structures as actual C# objects</a:t>
+            </a:r>
+          </a:p>
+          <a:p>
+            <a:pPr marL="1657350" lvl="4" indent="-342900"/>
+            <a:r>
+              <a:rPr lang="en-US" dirty="0" smtClean="0"/>
+              <a:t>We get back semantic structures as actual C# objects</a:t>
+            </a:r>
+          </a:p>
+          <a:p>
+            <a:pPr marL="342900" lvl="1" indent="-342900"/>
+            <a:endParaRPr lang="en-US" dirty="0"/>
+          </a:p>
+          <a:p>
+            <a:endParaRPr lang="en-US" dirty="0"/>
+          </a:p>
+        </p:txBody>
+      </p:sp>
+      <p:sp>
+        <p:nvSpPr>
+          <p:cNvPr id="4" name="Footer Placeholder 3"/>
+          <p:cNvSpPr>
+            <a:spLocks noGrp="1"/>
+          </p:cNvSpPr>
+          <p:nvPr>
+            <p:ph type="ftr" sz="quarter" idx="11"/>
+          </p:nvPr>
+        </p:nvSpPr>
+        <p:spPr/>
+        <p:txBody>
+          <a:bodyPr/>
+          <a:lstStyle/>
+          <a:p>
+            <a:r>
+              <a:rPr lang="en-US" smtClean="0"/>
+              <a:t>(c) 2014 Marc Clifton</a:t>
+            </a:r>
+            <a:endParaRPr lang="en-US"/>
+          </a:p>
+        </p:txBody>
+      </p:sp>
+    </p:spTree>
+    <p:extLst>
+      <p:ext uri="{BB962C8B-B14F-4D97-AF65-F5344CB8AC3E}">
+        <p14:creationId xmlns:p14="http://schemas.microsoft.com/office/powerpoint/2010/main" val="3216443533"/>
+      </p:ext>
+    </p:extLst>
+  </p:cSld>
+  <p:clrMapOvr>
+    <a:masterClrMapping/>
+  </p:clrMapOvr>
+</p:sld>
+</file>
+
+<file path=ppt/slides/slide24.xml><?xml version="1.0" encoding="utf-8"?>
+<p:sld xmlns:a="http://schemas.openxmlformats.org/drawingml/2006/main" xmlns:r="http://schemas.openxmlformats.org/officeDocument/2006/relationships" xmlns:p="http://schemas.openxmlformats.org/presentationml/2006/main">
+  <p:cSld>
+    <p:spTree>
+      <p:nvGrpSpPr>
+        <p:cNvPr id="1" name=""/>
+        <p:cNvGrpSpPr/>
+        <p:nvPr/>
+      </p:nvGrpSpPr>
+      <p:grpSpPr>
+        <a:xfrm>
+          <a:off x="0" y="0"/>
+          <a:ext cx="0" cy="0"/>
+          <a:chOff x="0" y="0"/>
+          <a:chExt cx="0" cy="0"/>
+        </a:xfrm>
+      </p:grpSpPr>
+      <p:sp>
+        <p:nvSpPr>
+          <p:cNvPr id="2" name="Title 1"/>
+          <p:cNvSpPr>
+            <a:spLocks noGrp="1"/>
+          </p:cNvSpPr>
+          <p:nvPr>
+            <p:ph type="title"/>
+          </p:nvPr>
+        </p:nvSpPr>
+        <p:spPr/>
+        <p:txBody>
+          <a:bodyPr/>
+          <a:lstStyle/>
+          <a:p>
+            <a:r>
+              <a:rPr lang="en-US" dirty="0" smtClean="0"/>
+              <a:t>Drawbacks of a Semantic Database</a:t>
+            </a:r>
+            <a:endParaRPr lang="en-US" dirty="0"/>
+          </a:p>
+        </p:txBody>
+      </p:sp>
+      <p:sp>
+        <p:nvSpPr>
+          <p:cNvPr id="3" name="Content Placeholder 2"/>
+          <p:cNvSpPr>
+            <a:spLocks noGrp="1"/>
+          </p:cNvSpPr>
+          <p:nvPr>
+            <p:ph idx="1"/>
+          </p:nvPr>
+        </p:nvSpPr>
+        <p:spPr>
+          <a:xfrm>
+            <a:off x="457200" y="1371600"/>
+            <a:ext cx="8229600" cy="4754563"/>
+          </a:xfrm>
+        </p:spPr>
+        <p:txBody>
+          <a:bodyPr>
+            <a:normAutofit fontScale="70000" lnSpcReduction="20000"/>
+          </a:bodyPr>
+          <a:lstStyle/>
+          <a:p>
+            <a:r>
+              <a:rPr lang="en-US" dirty="0" smtClean="0"/>
+              <a:t>Tables and their fields are organized by hierarchical rather than logical structure:</a:t>
+            </a:r>
+          </a:p>
+          <a:p>
+            <a:pPr lvl="1"/>
+            <a:r>
+              <a:rPr lang="en-US" dirty="0"/>
+              <a:t> </a:t>
+            </a:r>
+            <a:r>
+              <a:rPr lang="en-US" dirty="0" smtClean="0"/>
+              <a:t>We usually think about organizing information into logical associations and relationships</a:t>
+            </a:r>
+          </a:p>
+          <a:p>
+            <a:pPr lvl="1"/>
+            <a:r>
+              <a:rPr lang="en-US" dirty="0" smtClean="0"/>
+              <a:t>Hierarchical organization creates many more tables</a:t>
+            </a:r>
+          </a:p>
+          <a:p>
+            <a:pPr lvl="2"/>
+            <a:r>
+              <a:rPr lang="en-US" dirty="0" smtClean="0"/>
+              <a:t>The number of joins in a query can degrade performance.</a:t>
+            </a:r>
+          </a:p>
+          <a:p>
+            <a:pPr lvl="2"/>
+            <a:r>
+              <a:rPr lang="en-US" dirty="0" smtClean="0"/>
+              <a:t>Multiple insert operations are required to create the semantic type’s hierarchy. </a:t>
+            </a:r>
+          </a:p>
+          <a:p>
+            <a:pPr lvl="1"/>
+            <a:r>
+              <a:rPr lang="en-US" dirty="0" smtClean="0"/>
+              <a:t>Designing hierarchies isn’t easy</a:t>
+            </a:r>
+          </a:p>
+          <a:p>
+            <a:pPr lvl="2"/>
+            <a:r>
+              <a:rPr lang="en-US" dirty="0" smtClean="0"/>
+              <a:t>We need to learn how to think about multiple levels of abstraction.</a:t>
+            </a:r>
+          </a:p>
+          <a:p>
+            <a:pPr lvl="2"/>
+            <a:r>
+              <a:rPr lang="en-US" dirty="0" smtClean="0"/>
+              <a:t>We need to think carefully about unique native types and unique semantic types.</a:t>
+            </a:r>
+          </a:p>
+          <a:p>
+            <a:pPr lvl="1"/>
+            <a:r>
+              <a:rPr lang="en-US" dirty="0" smtClean="0"/>
+              <a:t>Writing SQL queries by hand is painful:</a:t>
+            </a:r>
+          </a:p>
+          <a:p>
+            <a:pPr lvl="2"/>
+            <a:r>
+              <a:rPr lang="en-US" dirty="0" smtClean="0"/>
+              <a:t>lots of joins, often with multiple references to the native type tables making it hard to keep track of which FK join is associated with  what meaning-value.</a:t>
+            </a:r>
+          </a:p>
+          <a:p>
+            <a:pPr lvl="1"/>
+            <a:r>
+              <a:rPr lang="en-US" dirty="0" smtClean="0"/>
+              <a:t>Writing insert statements by hand is even more painful:</a:t>
+            </a:r>
+          </a:p>
+          <a:p>
+            <a:pPr lvl="2"/>
+            <a:r>
+              <a:rPr lang="en-US" dirty="0" smtClean="0"/>
+              <a:t>multiple inserts from the bottom up, requiring the ID of the child table to populate the foreign key in the parent table.</a:t>
+            </a:r>
+          </a:p>
+          <a:p>
+            <a:pPr lvl="1"/>
+            <a:endParaRPr lang="en-US" dirty="0"/>
+          </a:p>
+        </p:txBody>
+      </p:sp>
+      <p:sp>
+        <p:nvSpPr>
+          <p:cNvPr id="4" name="Footer Placeholder 3"/>
+          <p:cNvSpPr>
+            <a:spLocks noGrp="1"/>
+          </p:cNvSpPr>
+          <p:nvPr>
+            <p:ph type="ftr" sz="quarter" idx="11"/>
+          </p:nvPr>
+        </p:nvSpPr>
+        <p:spPr/>
+        <p:txBody>
+          <a:bodyPr/>
+          <a:lstStyle/>
+          <a:p>
+            <a:r>
+              <a:rPr lang="en-US" smtClean="0"/>
+              <a:t>(c) 2014 Marc Clifton</a:t>
+            </a:r>
+            <a:endParaRPr lang="en-US"/>
+          </a:p>
+        </p:txBody>
+      </p:sp>
+    </p:spTree>
+    <p:extLst>
+      <p:ext uri="{BB962C8B-B14F-4D97-AF65-F5344CB8AC3E}">
+        <p14:creationId xmlns:p14="http://schemas.microsoft.com/office/powerpoint/2010/main" val="3403571843"/>
+      </p:ext>
+    </p:extLst>
+  </p:cSld>
+  <p:clrMapOvr>
+    <a:masterClrMapping/>
+  </p:clrMapOvr>
+</p:sld>
+</file>
+
+<file path=ppt/slides/slide25.xml><?xml version="1.0" encoding="utf-8"?>
+<p:sld xmlns:a="http://schemas.openxmlformats.org/drawingml/2006/main" xmlns:r="http://schemas.openxmlformats.org/officeDocument/2006/relationships" xmlns:p="http://schemas.openxmlformats.org/presentationml/2006/main">
+  <p:cSld>
+    <p:spTree>
+      <p:nvGrpSpPr>
+        <p:cNvPr id="1" name=""/>
+        <p:cNvGrpSpPr/>
+        <p:nvPr/>
+      </p:nvGrpSpPr>
+      <p:grpSpPr>
+        <a:xfrm>
+          <a:off x="0" y="0"/>
+          <a:ext cx="0" cy="0"/>
+          <a:chOff x="0" y="0"/>
+          <a:chExt cx="0" cy="0"/>
+        </a:xfrm>
+      </p:grpSpPr>
+      <p:sp>
+        <p:nvSpPr>
+          <p:cNvPr id="2" name="Title 1"/>
+          <p:cNvSpPr>
+            <a:spLocks noGrp="1"/>
+          </p:cNvSpPr>
+          <p:nvPr>
+            <p:ph type="title"/>
+          </p:nvPr>
+        </p:nvSpPr>
+        <p:spPr/>
+        <p:txBody>
+          <a:bodyPr/>
+          <a:lstStyle/>
+          <a:p>
+            <a:r>
+              <a:rPr lang="en-US" dirty="0" smtClean="0"/>
+              <a:t>Addressing Drawbacks</a:t>
+            </a:r>
+            <a:endParaRPr lang="en-US" dirty="0"/>
+          </a:p>
+        </p:txBody>
+      </p:sp>
+      <p:sp>
+        <p:nvSpPr>
+          <p:cNvPr id="3" name="Content Placeholder 2"/>
+          <p:cNvSpPr>
+            <a:spLocks noGrp="1"/>
+          </p:cNvSpPr>
+          <p:nvPr>
+            <p:ph idx="1"/>
+          </p:nvPr>
+        </p:nvSpPr>
+        <p:spPr/>
+        <p:txBody>
+          <a:bodyPr>
+            <a:normAutofit fontScale="92500" lnSpcReduction="10000"/>
+          </a:bodyPr>
+          <a:lstStyle/>
+          <a:p>
+            <a:r>
+              <a:rPr lang="en-US" dirty="0" smtClean="0"/>
+              <a:t>A Semantic Database engine can address some of these drawbacks:</a:t>
+            </a:r>
+          </a:p>
+          <a:p>
+            <a:pPr lvl="1"/>
+            <a:r>
+              <a:rPr lang="en-US" dirty="0" smtClean="0"/>
+              <a:t>Automating SQL query generation</a:t>
+            </a:r>
+          </a:p>
+          <a:p>
+            <a:pPr lvl="2"/>
+            <a:r>
+              <a:rPr lang="en-US" dirty="0" smtClean="0"/>
+              <a:t>Hides the hierarchy and table joins</a:t>
+            </a:r>
+          </a:p>
+          <a:p>
+            <a:pPr lvl="1"/>
+            <a:r>
+              <a:rPr lang="en-US" dirty="0" smtClean="0"/>
+              <a:t>Automating SQL inserts</a:t>
+            </a:r>
+          </a:p>
+          <a:p>
+            <a:pPr lvl="2"/>
+            <a:r>
+              <a:rPr lang="en-US" dirty="0" smtClean="0"/>
+              <a:t>Managing all the necessary FK ID’s</a:t>
+            </a:r>
+          </a:p>
+          <a:p>
+            <a:pPr lvl="1"/>
+            <a:r>
+              <a:rPr lang="en-US" dirty="0" smtClean="0"/>
+              <a:t>Improving Performance</a:t>
+            </a:r>
+          </a:p>
+          <a:p>
+            <a:pPr lvl="2"/>
+            <a:r>
+              <a:rPr lang="en-US" dirty="0"/>
+              <a:t>Caching </a:t>
+            </a:r>
+            <a:r>
+              <a:rPr lang="en-US" dirty="0" smtClean="0"/>
+              <a:t>queries </a:t>
+            </a:r>
+            <a:r>
+              <a:rPr lang="en-US" dirty="0"/>
+              <a:t>so the engine doesn’t have to re-create the SQL statement every </a:t>
+            </a:r>
+            <a:r>
+              <a:rPr lang="en-US" dirty="0" smtClean="0"/>
+              <a:t>time.</a:t>
+            </a:r>
+            <a:endParaRPr lang="en-US" dirty="0"/>
+          </a:p>
+          <a:p>
+            <a:pPr lvl="2"/>
+            <a:r>
+              <a:rPr lang="en-US" dirty="0" smtClean="0"/>
+              <a:t>Use prepared statements so the server isn’t parsing and analyzing the query statement every time it’s used.</a:t>
+            </a:r>
+            <a:endParaRPr lang="en-US" dirty="0"/>
+          </a:p>
+        </p:txBody>
+      </p:sp>
+      <p:sp>
+        <p:nvSpPr>
+          <p:cNvPr id="4" name="Footer Placeholder 3"/>
+          <p:cNvSpPr>
+            <a:spLocks noGrp="1"/>
+          </p:cNvSpPr>
+          <p:nvPr>
+            <p:ph type="ftr" sz="quarter" idx="11"/>
+          </p:nvPr>
+        </p:nvSpPr>
+        <p:spPr/>
+        <p:txBody>
+          <a:bodyPr/>
+          <a:lstStyle/>
+          <a:p>
+            <a:r>
+              <a:rPr lang="en-US" smtClean="0"/>
+              <a:t>(c) 2014 Marc Clifton</a:t>
+            </a:r>
+            <a:endParaRPr lang="en-US"/>
+          </a:p>
+        </p:txBody>
+      </p:sp>
+    </p:spTree>
+    <p:extLst>
+      <p:ext uri="{BB962C8B-B14F-4D97-AF65-F5344CB8AC3E}">
+        <p14:creationId xmlns:p14="http://schemas.microsoft.com/office/powerpoint/2010/main" val="3971445647"/>
+      </p:ext>
+    </p:extLst>
+  </p:cSld>
+  <p:clrMapOvr>
+    <a:masterClrMapping/>
+  </p:clrMapOvr>
+</p:sld>
+</file>
+
+<file path=ppt/slides/slide26.xml><?xml version="1.0" encoding="utf-8"?>
+<p:sld xmlns:a="http://schemas.openxmlformats.org/drawingml/2006/main" xmlns:r="http://schemas.openxmlformats.org/officeDocument/2006/relationships" xmlns:p="http://schemas.openxmlformats.org/presentationml/2006/main">
+  <p:cSld>
+    <p:spTree>
+      <p:nvGrpSpPr>
+        <p:cNvPr id="1" name=""/>
+        <p:cNvGrpSpPr/>
+        <p:nvPr/>
+      </p:nvGrpSpPr>
+      <p:grpSpPr>
+        <a:xfrm>
+          <a:off x="0" y="0"/>
+          <a:ext cx="0" cy="0"/>
+          <a:chOff x="0" y="0"/>
+          <a:chExt cx="0" cy="0"/>
+        </a:xfrm>
+      </p:grpSpPr>
+      <p:sp>
+        <p:nvSpPr>
+          <p:cNvPr id="2" name="Title 1"/>
+          <p:cNvSpPr>
+            <a:spLocks noGrp="1"/>
+          </p:cNvSpPr>
+          <p:nvPr>
+            <p:ph type="title"/>
+          </p:nvPr>
+        </p:nvSpPr>
+        <p:spPr/>
+        <p:txBody>
+          <a:bodyPr>
+            <a:normAutofit fontScale="90000"/>
+          </a:bodyPr>
+          <a:lstStyle/>
+          <a:p>
+            <a:r>
+              <a:rPr lang="en-US" dirty="0" smtClean="0"/>
+              <a:t>Time for a Demonstration:</a:t>
+            </a:r>
+            <a:br>
+              <a:rPr lang="en-US" dirty="0" smtClean="0"/>
+            </a:br>
+            <a:r>
+              <a:rPr lang="en-US" sz="3600" dirty="0" smtClean="0"/>
+              <a:t>An RSS Feed Reader</a:t>
+            </a:r>
+            <a:endParaRPr lang="en-US" sz="3600" dirty="0"/>
+          </a:p>
+        </p:txBody>
+      </p:sp>
+      <p:sp>
+        <p:nvSpPr>
+          <p:cNvPr id="3" name="Content Placeholder 2"/>
+          <p:cNvSpPr>
+            <a:spLocks noGrp="1"/>
+          </p:cNvSpPr>
+          <p:nvPr>
+            <p:ph idx="1"/>
+          </p:nvPr>
+        </p:nvSpPr>
+        <p:spPr/>
+        <p:txBody>
+          <a:bodyPr>
+            <a:normAutofit fontScale="92500" lnSpcReduction="10000"/>
+          </a:bodyPr>
+          <a:lstStyle/>
+          <a:p>
+            <a:r>
+              <a:rPr lang="en-US" dirty="0" smtClean="0"/>
+              <a:t>We’ve already explored some of the core semantic types</a:t>
+            </a:r>
+          </a:p>
+          <a:p>
+            <a:r>
+              <a:rPr lang="en-US" dirty="0" smtClean="0"/>
+              <a:t>We will use the Higher Order Programming Environment to demonstrate the:</a:t>
+            </a:r>
+          </a:p>
+          <a:p>
+            <a:pPr lvl="1"/>
+            <a:r>
+              <a:rPr lang="en-US" dirty="0" smtClean="0"/>
+              <a:t>Semantic Database engine</a:t>
+            </a:r>
+          </a:p>
+          <a:p>
+            <a:pPr lvl="1"/>
+            <a:r>
+              <a:rPr lang="en-US" dirty="0" smtClean="0"/>
+              <a:t>Semantic Types</a:t>
+            </a:r>
+          </a:p>
+          <a:p>
+            <a:pPr lvl="1"/>
+            <a:r>
+              <a:rPr lang="en-US" dirty="0" smtClean="0"/>
+              <a:t>User Interface</a:t>
+            </a:r>
+          </a:p>
+          <a:p>
+            <a:pPr lvl="1"/>
+            <a:r>
+              <a:rPr lang="en-US" dirty="0" smtClean="0"/>
+              <a:t>Queries</a:t>
+            </a:r>
+          </a:p>
+          <a:p>
+            <a:r>
+              <a:rPr lang="en-US" dirty="0" smtClean="0"/>
+              <a:t>We will inspect some of the actual SQL statements</a:t>
+            </a:r>
+            <a:endParaRPr lang="en-US" dirty="0"/>
+          </a:p>
+        </p:txBody>
+      </p:sp>
+      <p:sp>
+        <p:nvSpPr>
+          <p:cNvPr id="4" name="Footer Placeholder 3"/>
+          <p:cNvSpPr>
+            <a:spLocks noGrp="1"/>
+          </p:cNvSpPr>
+          <p:nvPr>
+            <p:ph type="ftr" sz="quarter" idx="11"/>
+          </p:nvPr>
+        </p:nvSpPr>
+        <p:spPr/>
+        <p:txBody>
+          <a:bodyPr/>
+          <a:lstStyle/>
+          <a:p>
+            <a:r>
+              <a:rPr lang="en-US" smtClean="0"/>
+              <a:t>(c) 2014 Marc Clifton</a:t>
+            </a:r>
+            <a:endParaRPr lang="en-US"/>
+          </a:p>
+        </p:txBody>
+      </p:sp>
+    </p:spTree>
+    <p:extLst>
+      <p:ext uri="{BB962C8B-B14F-4D97-AF65-F5344CB8AC3E}">
+        <p14:creationId xmlns:p14="http://schemas.microsoft.com/office/powerpoint/2010/main" val="3768064573"/>
       </p:ext>
     </p:extLst>
   </p:cSld>

</xml_diff>

<commit_message>
Fixing code-smell (simplifying functions) and fixing a couple unit test problems.  Also WIP on the article.
</commit_message>
<xml_diff>
--- a/Articles/semantic database slide show.pptx
+++ b/Articles/semantic database slide show.pptx
@@ -217,7 +217,8 @@
           <a:p>
             <a:fld id="{1BBCEE66-0EE9-4D66-AF75-6E9EC16E6DD4}" type="datetimeFigureOut">
               <a:rPr lang="en-US" smtClean="0"/>
-              <a:t>10/19/2014</a:t>
+              <a:pPr/>
+              <a:t>10/21/2014</a:t>
             </a:fld>
             <a:endParaRPr lang="en-US"/>
           </a:p>
@@ -378,6 +379,7 @@
           <a:p>
             <a:fld id="{A94A4E8C-D108-4C7E-A333-25DC9E294951}" type="slidenum">
               <a:rPr lang="en-US" smtClean="0"/>
+              <a:pPr/>
               <a:t>‹#›</a:t>
             </a:fld>
             <a:endParaRPr lang="en-US"/>
@@ -387,7 +389,7 @@
     </p:spTree>
     <p:extLst>
       <p:ext uri="{BB962C8B-B14F-4D97-AF65-F5344CB8AC3E}">
-        <p14:creationId xmlns:p14="http://schemas.microsoft.com/office/powerpoint/2010/main" val="4242917381"/>
+        <p14:creationId xmlns:p14="http://schemas.microsoft.com/office/powerpoint/2010/main" xmlns="" val="4242917381"/>
       </p:ext>
     </p:extLst>
   </p:cSld>
@@ -668,7 +670,8 @@
           <a:p>
             <a:fld id="{416F8EEF-37D8-470A-AB7E-2B3D8D36A7EE}" type="datetime1">
               <a:rPr lang="en-US" smtClean="0"/>
-              <a:t>10/19/2014</a:t>
+              <a:pPr/>
+              <a:t>10/21/2014</a:t>
             </a:fld>
             <a:endParaRPr lang="en-US"/>
           </a:p>
@@ -714,6 +717,7 @@
           <a:p>
             <a:fld id="{35C0661F-DCBB-41DA-917A-941AA831F0B3}" type="slidenum">
               <a:rPr lang="en-US" smtClean="0"/>
+              <a:pPr/>
               <a:t>‹#›</a:t>
             </a:fld>
             <a:endParaRPr lang="en-US"/>
@@ -837,7 +841,8 @@
           <a:p>
             <a:fld id="{574DA3A6-D6F5-4169-BAE7-564F753905E4}" type="datetime1">
               <a:rPr lang="en-US" smtClean="0"/>
-              <a:t>10/19/2014</a:t>
+              <a:pPr/>
+              <a:t>10/21/2014</a:t>
             </a:fld>
             <a:endParaRPr lang="en-US"/>
           </a:p>
@@ -883,6 +888,7 @@
           <a:p>
             <a:fld id="{35C0661F-DCBB-41DA-917A-941AA831F0B3}" type="slidenum">
               <a:rPr lang="en-US" smtClean="0"/>
+              <a:pPr/>
               <a:t>‹#›</a:t>
             </a:fld>
             <a:endParaRPr lang="en-US"/>
@@ -1016,7 +1022,8 @@
           <a:p>
             <a:fld id="{A2848701-8AC6-4C73-9B69-A7E40F70EFF8}" type="datetime1">
               <a:rPr lang="en-US" smtClean="0"/>
-              <a:t>10/19/2014</a:t>
+              <a:pPr/>
+              <a:t>10/21/2014</a:t>
             </a:fld>
             <a:endParaRPr lang="en-US"/>
           </a:p>
@@ -1062,6 +1069,7 @@
           <a:p>
             <a:fld id="{35C0661F-DCBB-41DA-917A-941AA831F0B3}" type="slidenum">
               <a:rPr lang="en-US" smtClean="0"/>
+              <a:pPr/>
               <a:t>‹#›</a:t>
             </a:fld>
             <a:endParaRPr lang="en-US"/>
@@ -1185,7 +1193,8 @@
           <a:p>
             <a:fld id="{DA635438-721C-4CE7-AC51-D734B92A82C4}" type="datetime1">
               <a:rPr lang="en-US" smtClean="0"/>
-              <a:t>10/19/2014</a:t>
+              <a:pPr/>
+              <a:t>10/21/2014</a:t>
             </a:fld>
             <a:endParaRPr lang="en-US"/>
           </a:p>
@@ -1231,6 +1240,7 @@
           <a:p>
             <a:fld id="{35C0661F-DCBB-41DA-917A-941AA831F0B3}" type="slidenum">
               <a:rPr lang="en-US" smtClean="0"/>
+              <a:pPr/>
               <a:t>‹#›</a:t>
             </a:fld>
             <a:endParaRPr lang="en-US"/>
@@ -1430,7 +1440,8 @@
           <a:p>
             <a:fld id="{92D44B8D-F0F2-4664-87AA-91B33D3773D3}" type="datetime1">
               <a:rPr lang="en-US" smtClean="0"/>
-              <a:t>10/19/2014</a:t>
+              <a:pPr/>
+              <a:t>10/21/2014</a:t>
             </a:fld>
             <a:endParaRPr lang="en-US"/>
           </a:p>
@@ -1476,6 +1487,7 @@
           <a:p>
             <a:fld id="{35C0661F-DCBB-41DA-917A-941AA831F0B3}" type="slidenum">
               <a:rPr lang="en-US" smtClean="0"/>
+              <a:pPr/>
               <a:t>‹#›</a:t>
             </a:fld>
             <a:endParaRPr lang="en-US"/>
@@ -1717,7 +1729,8 @@
           <a:p>
             <a:fld id="{DFFCA1ED-0C31-4556-95EC-AF16BC50EBBC}" type="datetime1">
               <a:rPr lang="en-US" smtClean="0"/>
-              <a:t>10/19/2014</a:t>
+              <a:pPr/>
+              <a:t>10/21/2014</a:t>
             </a:fld>
             <a:endParaRPr lang="en-US"/>
           </a:p>
@@ -1763,6 +1776,7 @@
           <a:p>
             <a:fld id="{35C0661F-DCBB-41DA-917A-941AA831F0B3}" type="slidenum">
               <a:rPr lang="en-US" smtClean="0"/>
+              <a:pPr/>
               <a:t>‹#›</a:t>
             </a:fld>
             <a:endParaRPr lang="en-US"/>
@@ -2138,7 +2152,8 @@
           <a:p>
             <a:fld id="{98F8F976-7837-4A70-814E-9AC64E1F5B10}" type="datetime1">
               <a:rPr lang="en-US" smtClean="0"/>
-              <a:t>10/19/2014</a:t>
+              <a:pPr/>
+              <a:t>10/21/2014</a:t>
             </a:fld>
             <a:endParaRPr lang="en-US"/>
           </a:p>
@@ -2184,6 +2199,7 @@
           <a:p>
             <a:fld id="{35C0661F-DCBB-41DA-917A-941AA831F0B3}" type="slidenum">
               <a:rPr lang="en-US" smtClean="0"/>
+              <a:pPr/>
               <a:t>‹#›</a:t>
             </a:fld>
             <a:endParaRPr lang="en-US"/>
@@ -2255,7 +2271,8 @@
           <a:p>
             <a:fld id="{C953CE0E-2CDE-477B-9918-92DBFD9FFB13}" type="datetime1">
               <a:rPr lang="en-US" smtClean="0"/>
-              <a:t>10/19/2014</a:t>
+              <a:pPr/>
+              <a:t>10/21/2014</a:t>
             </a:fld>
             <a:endParaRPr lang="en-US"/>
           </a:p>
@@ -2301,6 +2318,7 @@
           <a:p>
             <a:fld id="{35C0661F-DCBB-41DA-917A-941AA831F0B3}" type="slidenum">
               <a:rPr lang="en-US" smtClean="0"/>
+              <a:pPr/>
               <a:t>‹#›</a:t>
             </a:fld>
             <a:endParaRPr lang="en-US"/>
@@ -2349,7 +2367,8 @@
           <a:p>
             <a:fld id="{B85A8BCB-E84D-41C9-B49A-575D31685D0E}" type="datetime1">
               <a:rPr lang="en-US" smtClean="0"/>
-              <a:t>10/19/2014</a:t>
+              <a:pPr/>
+              <a:t>10/21/2014</a:t>
             </a:fld>
             <a:endParaRPr lang="en-US"/>
           </a:p>
@@ -2395,6 +2414,7 @@
           <a:p>
             <a:fld id="{35C0661F-DCBB-41DA-917A-941AA831F0B3}" type="slidenum">
               <a:rPr lang="en-US" smtClean="0"/>
+              <a:pPr/>
               <a:t>‹#›</a:t>
             </a:fld>
             <a:endParaRPr lang="en-US"/>
@@ -2625,7 +2645,8 @@
           <a:p>
             <a:fld id="{E6546150-F9C5-4174-93F1-E118D03D411E}" type="datetime1">
               <a:rPr lang="en-US" smtClean="0"/>
-              <a:t>10/19/2014</a:t>
+              <a:pPr/>
+              <a:t>10/21/2014</a:t>
             </a:fld>
             <a:endParaRPr lang="en-US"/>
           </a:p>
@@ -2671,6 +2692,7 @@
           <a:p>
             <a:fld id="{35C0661F-DCBB-41DA-917A-941AA831F0B3}" type="slidenum">
               <a:rPr lang="en-US" smtClean="0"/>
+              <a:pPr/>
               <a:t>‹#›</a:t>
             </a:fld>
             <a:endParaRPr lang="en-US"/>
@@ -2877,7 +2899,8 @@
           <a:p>
             <a:fld id="{267CFDA4-22F4-40DB-A543-AB48B3BE05CD}" type="datetime1">
               <a:rPr lang="en-US" smtClean="0"/>
-              <a:t>10/19/2014</a:t>
+              <a:pPr/>
+              <a:t>10/21/2014</a:t>
             </a:fld>
             <a:endParaRPr lang="en-US"/>
           </a:p>
@@ -2923,6 +2946,7 @@
           <a:p>
             <a:fld id="{35C0661F-DCBB-41DA-917A-941AA831F0B3}" type="slidenum">
               <a:rPr lang="en-US" smtClean="0"/>
+              <a:pPr/>
               <a:t>‹#›</a:t>
             </a:fld>
             <a:endParaRPr lang="en-US"/>
@@ -3089,7 +3113,8 @@
           <a:p>
             <a:fld id="{1A9CB782-FDB5-4A81-BFCE-B54E8C709764}" type="datetime1">
               <a:rPr lang="en-US" smtClean="0"/>
-              <a:t>10/19/2014</a:t>
+              <a:pPr/>
+              <a:t>10/21/2014</a:t>
             </a:fld>
             <a:endParaRPr lang="en-US"/>
           </a:p>
@@ -3171,6 +3196,7 @@
           <a:p>
             <a:fld id="{35C0661F-DCBB-41DA-917A-941AA831F0B3}" type="slidenum">
               <a:rPr lang="en-US" smtClean="0"/>
+              <a:pPr/>
               <a:t>‹#›</a:t>
             </a:fld>
             <a:endParaRPr lang="en-US"/>
@@ -4122,7 +4148,15 @@
             <a:pPr lvl="3"/>
             <a:r>
               <a:rPr lang="en-US" dirty="0" smtClean="0"/>
-              <a:t>“select URL from </a:t>
+              <a:t>“select </a:t>
+            </a:r>
+            <a:r>
+              <a:rPr lang="en-US" dirty="0" smtClean="0"/>
+              <a:t>Value </a:t>
+            </a:r>
+            <a:r>
+              <a:rPr lang="en-US" dirty="0" smtClean="0"/>
+              <a:t>from </a:t>
             </a:r>
             <a:r>
               <a:rPr lang="en-US" dirty="0" err="1" smtClean="0"/>
@@ -4578,7 +4612,35 @@
             <a:pPr lvl="1"/>
             <a:r>
               <a:rPr lang="en-US" dirty="0" smtClean="0"/>
-              <a:t>The result is associations that not semantic but rather structural, leading to complex model diagrams</a:t>
+              <a:t>The result </a:t>
+            </a:r>
+            <a:r>
+              <a:rPr lang="en-US" dirty="0" smtClean="0"/>
+              <a:t>are</a:t>
+            </a:r>
+            <a:r>
+              <a:rPr lang="en-US" dirty="0" smtClean="0"/>
+              <a:t> </a:t>
+            </a:r>
+            <a:r>
+              <a:rPr lang="en-US" dirty="0" smtClean="0"/>
+              <a:t>associations that </a:t>
+            </a:r>
+            <a:r>
+              <a:rPr lang="en-US" dirty="0" smtClean="0"/>
+              <a:t>are not </a:t>
+            </a:r>
+            <a:r>
+              <a:rPr lang="en-US" dirty="0" smtClean="0"/>
+              <a:t>semantic but rather </a:t>
+            </a:r>
+            <a:r>
+              <a:rPr lang="en-US" dirty="0" smtClean="0"/>
+              <a:t>abstracted un-natural structural relationships, </a:t>
+            </a:r>
+            <a:r>
+              <a:rPr lang="en-US" dirty="0" smtClean="0"/>
+              <a:t>leading to complex model diagrams</a:t>
             </a:r>
           </a:p>
           <a:p>
@@ -5182,7 +5244,7 @@
           <a:blip r:embed="rId2">
             <a:extLst>
               <a:ext uri="{28A0092B-C50C-407E-A947-70E740481C1C}">
-                <a14:useLocalDpi xmlns:a14="http://schemas.microsoft.com/office/drawing/2010/main" val="0"/>
+                <a14:useLocalDpi xmlns:a14="http://schemas.microsoft.com/office/drawing/2010/main" xmlns="" val="0"/>
               </a:ext>
             </a:extLst>
           </a:blip>
@@ -5206,14 +5268,14 @@
           <a:effectLst/>
           <a:extLst>
             <a:ext uri="{909E8E84-426E-40DD-AFC4-6F175D3DCCD1}">
-              <a14:hiddenFill xmlns:a14="http://schemas.microsoft.com/office/drawing/2010/main">
+              <a14:hiddenFill xmlns:a14="http://schemas.microsoft.com/office/drawing/2010/main" xmlns="">
                 <a:solidFill>
                   <a:schemeClr val="accent1"/>
                 </a:solidFill>
               </a14:hiddenFill>
             </a:ext>
             <a:ext uri="{91240B29-F687-4F45-9708-019B960494DF}">
-              <a14:hiddenLine xmlns:a14="http://schemas.microsoft.com/office/drawing/2010/main" w="9525">
+              <a14:hiddenLine xmlns:a14="http://schemas.microsoft.com/office/drawing/2010/main" xmlns="" w="9525">
                 <a:solidFill>
                   <a:schemeClr val="tx1"/>
                 </a:solidFill>
@@ -5223,7 +5285,7 @@
               </a14:hiddenLine>
             </a:ext>
             <a:ext uri="{AF507438-7753-43E0-B8FC-AC1667EBCBE1}">
-              <a14:hiddenEffects xmlns:a14="http://schemas.microsoft.com/office/drawing/2010/main">
+              <a14:hiddenEffects xmlns:a14="http://schemas.microsoft.com/office/drawing/2010/main" xmlns="">
                 <a:effectLst>
                   <a:outerShdw dist="35921" dir="2700000" algn="ctr" rotWithShape="0">
                     <a:schemeClr val="bg2"/>
@@ -5237,7 +5299,7 @@
     </p:spTree>
     <p:extLst>
       <p:ext uri="{BB962C8B-B14F-4D97-AF65-F5344CB8AC3E}">
-        <p14:creationId xmlns:p14="http://schemas.microsoft.com/office/powerpoint/2010/main" val="740560620"/>
+        <p14:creationId xmlns:p14="http://schemas.microsoft.com/office/powerpoint/2010/main" xmlns="" val="740560620"/>
       </p:ext>
     </p:extLst>
   </p:cSld>
@@ -5479,7 +5541,7 @@
           <a:blip r:embed="rId2">
             <a:extLst>
               <a:ext uri="{28A0092B-C50C-407E-A947-70E740481C1C}">
-                <a14:useLocalDpi xmlns:a14="http://schemas.microsoft.com/office/drawing/2010/main" val="0"/>
+                <a14:useLocalDpi xmlns:a14="http://schemas.microsoft.com/office/drawing/2010/main" xmlns="" val="0"/>
               </a:ext>
             </a:extLst>
           </a:blip>
@@ -5503,14 +5565,14 @@
           <a:effectLst/>
           <a:extLst>
             <a:ext uri="{909E8E84-426E-40DD-AFC4-6F175D3DCCD1}">
-              <a14:hiddenFill xmlns:a14="http://schemas.microsoft.com/office/drawing/2010/main">
+              <a14:hiddenFill xmlns:a14="http://schemas.microsoft.com/office/drawing/2010/main" xmlns="">
                 <a:solidFill>
                   <a:schemeClr val="accent1"/>
                 </a:solidFill>
               </a14:hiddenFill>
             </a:ext>
             <a:ext uri="{91240B29-F687-4F45-9708-019B960494DF}">
-              <a14:hiddenLine xmlns:a14="http://schemas.microsoft.com/office/drawing/2010/main" w="9525">
+              <a14:hiddenLine xmlns:a14="http://schemas.microsoft.com/office/drawing/2010/main" xmlns="" w="9525">
                 <a:solidFill>
                   <a:schemeClr val="tx1"/>
                 </a:solidFill>
@@ -5520,7 +5582,7 @@
               </a14:hiddenLine>
             </a:ext>
             <a:ext uri="{AF507438-7753-43E0-B8FC-AC1667EBCBE1}">
-              <a14:hiddenEffects xmlns:a14="http://schemas.microsoft.com/office/drawing/2010/main">
+              <a14:hiddenEffects xmlns:a14="http://schemas.microsoft.com/office/drawing/2010/main" xmlns="">
                 <a:effectLst>
                   <a:outerShdw dist="35921" dir="2700000" algn="ctr" rotWithShape="0">
                     <a:schemeClr val="bg2"/>
@@ -5543,7 +5605,7 @@
           <a:blip r:embed="rId3">
             <a:extLst>
               <a:ext uri="{28A0092B-C50C-407E-A947-70E740481C1C}">
-                <a14:useLocalDpi xmlns:a14="http://schemas.microsoft.com/office/drawing/2010/main" val="0"/>
+                <a14:useLocalDpi xmlns:a14="http://schemas.microsoft.com/office/drawing/2010/main" xmlns="" val="0"/>
               </a:ext>
             </a:extLst>
           </a:blip>
@@ -5567,14 +5629,14 @@
           <a:effectLst/>
           <a:extLst>
             <a:ext uri="{909E8E84-426E-40DD-AFC4-6F175D3DCCD1}">
-              <a14:hiddenFill xmlns:a14="http://schemas.microsoft.com/office/drawing/2010/main">
+              <a14:hiddenFill xmlns:a14="http://schemas.microsoft.com/office/drawing/2010/main" xmlns="">
                 <a:solidFill>
                   <a:schemeClr val="accent1"/>
                 </a:solidFill>
               </a14:hiddenFill>
             </a:ext>
             <a:ext uri="{91240B29-F687-4F45-9708-019B960494DF}">
-              <a14:hiddenLine xmlns:a14="http://schemas.microsoft.com/office/drawing/2010/main" w="9525">
+              <a14:hiddenLine xmlns:a14="http://schemas.microsoft.com/office/drawing/2010/main" xmlns="" w="9525">
                 <a:solidFill>
                   <a:schemeClr val="tx1"/>
                 </a:solidFill>
@@ -5584,7 +5646,7 @@
               </a14:hiddenLine>
             </a:ext>
             <a:ext uri="{AF507438-7753-43E0-B8FC-AC1667EBCBE1}">
-              <a14:hiddenEffects xmlns:a14="http://schemas.microsoft.com/office/drawing/2010/main">
+              <a14:hiddenEffects xmlns:a14="http://schemas.microsoft.com/office/drawing/2010/main" xmlns="">
                 <a:effectLst>
                   <a:outerShdw dist="35921" dir="2700000" algn="ctr" rotWithShape="0">
                     <a:schemeClr val="bg2"/>
@@ -5598,7 +5660,7 @@
     </p:spTree>
     <p:extLst>
       <p:ext uri="{BB962C8B-B14F-4D97-AF65-F5344CB8AC3E}">
-        <p14:creationId xmlns:p14="http://schemas.microsoft.com/office/powerpoint/2010/main" val="1163032118"/>
+        <p14:creationId xmlns:p14="http://schemas.microsoft.com/office/powerpoint/2010/main" xmlns="" val="1163032118"/>
       </p:ext>
     </p:extLst>
   </p:cSld>
@@ -5686,13 +5748,8 @@
             <a:pPr lvl="1"/>
             <a:r>
               <a:rPr lang="en-US" dirty="0" smtClean="0"/>
-              <a:t>What are the URL’s we have </a:t>
-            </a:r>
-            <a:r>
-              <a:rPr lang="en-US" dirty="0" smtClean="0"/>
-              <a:t>visited?</a:t>
-            </a:r>
-            <a:endParaRPr lang="en-US" dirty="0" smtClean="0"/>
+              <a:t>What are the URL’s we have visited?</a:t>
+            </a:r>
           </a:p>
           <a:p>
             <a:pPr lvl="1"/>
@@ -5756,7 +5813,7 @@
     </p:spTree>
     <p:extLst>
       <p:ext uri="{BB962C8B-B14F-4D97-AF65-F5344CB8AC3E}">
-        <p14:creationId xmlns:p14="http://schemas.microsoft.com/office/powerpoint/2010/main" val="3629026808"/>
+        <p14:creationId xmlns:p14="http://schemas.microsoft.com/office/powerpoint/2010/main" xmlns="" val="3629026808"/>
       </p:ext>
     </p:extLst>
   </p:cSld>
@@ -5863,7 +5920,7 @@
     </p:spTree>
     <p:extLst>
       <p:ext uri="{BB962C8B-B14F-4D97-AF65-F5344CB8AC3E}">
-        <p14:creationId xmlns:p14="http://schemas.microsoft.com/office/powerpoint/2010/main" val="1204671317"/>
+        <p14:creationId xmlns:p14="http://schemas.microsoft.com/office/powerpoint/2010/main" xmlns="" val="1204671317"/>
       </p:ext>
     </p:extLst>
   </p:cSld>
@@ -6020,7 +6077,7 @@
     </p:spTree>
     <p:extLst>
       <p:ext uri="{BB962C8B-B14F-4D97-AF65-F5344CB8AC3E}">
-        <p14:creationId xmlns:p14="http://schemas.microsoft.com/office/powerpoint/2010/main" val="3216443533"/>
+        <p14:creationId xmlns:p14="http://schemas.microsoft.com/office/powerpoint/2010/main" xmlns="" val="3216443533"/>
       </p:ext>
     </p:extLst>
   </p:cSld>
@@ -6210,7 +6267,7 @@
     </p:spTree>
     <p:extLst>
       <p:ext uri="{BB962C8B-B14F-4D97-AF65-F5344CB8AC3E}">
-        <p14:creationId xmlns:p14="http://schemas.microsoft.com/office/powerpoint/2010/main" val="3403571843"/>
+        <p14:creationId xmlns:p14="http://schemas.microsoft.com/office/powerpoint/2010/main" xmlns="" val="3403571843"/>
       </p:ext>
     </p:extLst>
   </p:cSld>
@@ -6373,7 +6430,7 @@
     </p:spTree>
     <p:extLst>
       <p:ext uri="{BB962C8B-B14F-4D97-AF65-F5344CB8AC3E}">
-        <p14:creationId xmlns:p14="http://schemas.microsoft.com/office/powerpoint/2010/main" val="3971445647"/>
+        <p14:creationId xmlns:p14="http://schemas.microsoft.com/office/powerpoint/2010/main" xmlns="" val="3971445647"/>
       </p:ext>
     </p:extLst>
   </p:cSld>
@@ -6523,7 +6580,7 @@
     </p:spTree>
     <p:extLst>
       <p:ext uri="{BB962C8B-B14F-4D97-AF65-F5344CB8AC3E}">
-        <p14:creationId xmlns:p14="http://schemas.microsoft.com/office/powerpoint/2010/main" val="3768064573"/>
+        <p14:creationId xmlns:p14="http://schemas.microsoft.com/office/powerpoint/2010/main" xmlns="" val="3768064573"/>
       </p:ext>
     </p:extLst>
   </p:cSld>

</xml_diff>